<commit_message>
Making DOCTYPE tag uppercase
</commit_message>
<xml_diff>
--- a/murach_html_4e/slides/Chapter 1 slides (Revised).pptx
+++ b/murach_html_4e/slides/Chapter 1 slides (Revised).pptx
@@ -5600,12 +5600,20 @@
               </a:tabLst>
             </a:pPr>
             <a:r>
+              <a:rPr lang="en-US" sz="1600" b="1">
+                <a:latin typeface="Courier New" panose="02070309020205020404" pitchFamily="49" charset="0"/>
+                <a:ea typeface="Times New Roman" panose="02020603050405020304" pitchFamily="18" charset="0"/>
+                <a:cs typeface="Times New Roman" panose="02020603050405020304" pitchFamily="18" charset="0"/>
+              </a:rPr>
+              <a:t>&lt;!DOCTYPE </a:t>
+            </a:r>
+            <a:r>
               <a:rPr lang="en-US" sz="1600" b="1" dirty="0">
                 <a:latin typeface="Courier New" panose="02070309020205020404" pitchFamily="49" charset="0"/>
                 <a:ea typeface="Times New Roman" panose="02020603050405020304" pitchFamily="18" charset="0"/>
                 <a:cs typeface="Times New Roman" panose="02020603050405020304" pitchFamily="18" charset="0"/>
               </a:rPr>
-              <a:t>&lt;!doctype html&gt;</a:t>
+              <a:t>html&gt;</a:t>
             </a:r>
           </a:p>
           <a:p>

</xml_diff>

<commit_message>
updating slides for chapters 1-3
</commit_message>
<xml_diff>
--- a/murach_html_4e/slides/Chapter 1 slides (Revised).pptx
+++ b/murach_html_4e/slides/Chapter 1 slides (Revised).pptx
@@ -5,10 +5,10 @@
     <p:sldMasterId id="2147483673" r:id="rId1"/>
   </p:sldMasterIdLst>
   <p:notesMasterIdLst>
-    <p:notesMasterId r:id="rId46"/>
+    <p:notesMasterId r:id="rId47"/>
   </p:notesMasterIdLst>
   <p:handoutMasterIdLst>
-    <p:handoutMasterId r:id="rId47"/>
+    <p:handoutMasterId r:id="rId48"/>
   </p:handoutMasterIdLst>
   <p:sldIdLst>
     <p:sldId id="256" r:id="rId2"/>
@@ -55,6 +55,7 @@
     <p:sldId id="294" r:id="rId43"/>
     <p:sldId id="301" r:id="rId44"/>
     <p:sldId id="302" r:id="rId45"/>
+    <p:sldId id="304" r:id="rId46"/>
   </p:sldIdLst>
   <p:sldSz cx="9144000" cy="6858000" type="screen4x3"/>
   <p:notesSz cx="7010400" cy="9296400"/>
@@ -373,7 +374,7 @@
               <a:pPr>
                 <a:defRPr/>
               </a:pPr>
-              <a:t>5/27/2020</a:t>
+              <a:t>5/28/2020</a:t>
             </a:fld>
             <a:endParaRPr lang="en-US"/>
           </a:p>
@@ -10244,15 +10245,15 @@
         </p:nvSpPr>
         <p:spPr>
           <a:xfrm>
-            <a:off x="6096000" y="5805100"/>
-            <a:ext cx="2818400" cy="276999"/>
+            <a:off x="4836379" y="5786735"/>
+            <a:ext cx="4078019" cy="276999"/>
           </a:xfrm>
           <a:prstGeom prst="rect">
             <a:avLst/>
           </a:prstGeom>
         </p:spPr>
         <p:txBody>
-          <a:bodyPr wrap="none">
+          <a:bodyPr wrap="square">
             <a:spAutoFit/>
           </a:bodyPr>
           <a:lstStyle/>
@@ -13066,7 +13067,7 @@
         </p:blipFill>
         <p:spPr>
           <a:xfrm>
-            <a:off x="5791200" y="3075125"/>
+            <a:off x="3447595" y="3061672"/>
             <a:ext cx="3181805" cy="2986431"/>
           </a:xfrm>
           <a:prstGeom prst="rect">
@@ -13088,7 +13089,7 @@
         </p:nvSpPr>
         <p:spPr bwMode="auto">
           <a:xfrm>
-            <a:off x="6172200" y="5334000"/>
+            <a:off x="3857397" y="5334000"/>
             <a:ext cx="2362200" cy="228600"/>
           </a:xfrm>
           <a:prstGeom prst="rect">
@@ -13451,7 +13452,7 @@
         </p:blipFill>
         <p:spPr>
           <a:xfrm>
-            <a:off x="2362200" y="2118055"/>
+            <a:off x="914400" y="1963479"/>
             <a:ext cx="6172200" cy="3827721"/>
           </a:xfrm>
           <a:prstGeom prst="rect">
@@ -13473,7 +13474,7 @@
         </p:nvSpPr>
         <p:spPr bwMode="auto">
           <a:xfrm>
-            <a:off x="2514600" y="4572000"/>
+            <a:off x="1066800" y="4417424"/>
             <a:ext cx="6019800" cy="914400"/>
           </a:xfrm>
           <a:prstGeom prst="rect">
@@ -13628,7 +13629,6 @@
               <a:buChar char="•"/>
             </a:pPr>
             <a:endParaRPr lang="en-US" sz="2000" b="1">
-              <a:latin typeface="Times New Roman" panose="02020603050405020304" pitchFamily="18" charset="0"/>
               <a:cs typeface="Times New Roman" panose="02020603050405020304" pitchFamily="18" charset="0"/>
             </a:endParaRPr>
           </a:p>
@@ -13639,13 +13639,11 @@
             </a:pPr>
             <a:r>
               <a:rPr lang="en-US" sz="2000" b="1">
-                <a:latin typeface="Times New Roman" panose="02020603050405020304" pitchFamily="18" charset="0"/>
                 <a:cs typeface="Times New Roman" panose="02020603050405020304" pitchFamily="18" charset="0"/>
               </a:rPr>
               <a:t>Usability</a:t>
             </a:r>
             <a:endParaRPr lang="en-US" sz="2000" b="1" dirty="0">
-              <a:latin typeface="Times New Roman" panose="02020603050405020304" pitchFamily="18" charset="0"/>
               <a:cs typeface="Times New Roman" panose="02020603050405020304" pitchFamily="18" charset="0"/>
             </a:endParaRPr>
           </a:p>
@@ -13655,7 +13653,6 @@
               <a:buChar char="•"/>
             </a:pPr>
             <a:endParaRPr lang="en-US" sz="2000" b="1">
-              <a:latin typeface="Times New Roman" panose="02020603050405020304" pitchFamily="18" charset="0"/>
               <a:cs typeface="Times New Roman" panose="02020603050405020304" pitchFamily="18" charset="0"/>
             </a:endParaRPr>
           </a:p>
@@ -13666,14 +13663,12 @@
             </a:pPr>
             <a:r>
               <a:rPr lang="en-US" sz="2000" b="1">
-                <a:latin typeface="Times New Roman" panose="02020603050405020304" pitchFamily="18" charset="0"/>
                 <a:cs typeface="Times New Roman" panose="02020603050405020304" pitchFamily="18" charset="0"/>
               </a:rPr>
               <a:t>Cross-browser </a:t>
             </a:r>
             <a:r>
               <a:rPr lang="en-US" sz="2000" b="1" dirty="0">
-                <a:latin typeface="Times New Roman" panose="02020603050405020304" pitchFamily="18" charset="0"/>
                 <a:cs typeface="Times New Roman" panose="02020603050405020304" pitchFamily="18" charset="0"/>
               </a:rPr>
               <a:t>Compatibility</a:t>
@@ -13685,7 +13680,6 @@
               <a:buChar char="•"/>
             </a:pPr>
             <a:endParaRPr lang="en-US" sz="2000" b="1">
-              <a:latin typeface="Times New Roman" panose="02020603050405020304" pitchFamily="18" charset="0"/>
               <a:cs typeface="Times New Roman" panose="02020603050405020304" pitchFamily="18" charset="0"/>
             </a:endParaRPr>
           </a:p>
@@ -13696,13 +13690,11 @@
             </a:pPr>
             <a:r>
               <a:rPr lang="en-US" sz="2000" b="1">
-                <a:latin typeface="Times New Roman" panose="02020603050405020304" pitchFamily="18" charset="0"/>
                 <a:cs typeface="Times New Roman" panose="02020603050405020304" pitchFamily="18" charset="0"/>
               </a:rPr>
               <a:t>Accessibility</a:t>
             </a:r>
             <a:endParaRPr lang="en-US" sz="2000" b="1" dirty="0">
-              <a:latin typeface="Times New Roman" panose="02020603050405020304" pitchFamily="18" charset="0"/>
               <a:cs typeface="Times New Roman" panose="02020603050405020304" pitchFamily="18" charset="0"/>
             </a:endParaRPr>
           </a:p>
@@ -13712,7 +13704,6 @@
               <a:buChar char="•"/>
             </a:pPr>
             <a:endParaRPr lang="en-US" sz="2000" b="1">
-              <a:latin typeface="Times New Roman" panose="02020603050405020304" pitchFamily="18" charset="0"/>
               <a:cs typeface="Times New Roman" panose="02020603050405020304" pitchFamily="18" charset="0"/>
             </a:endParaRPr>
           </a:p>
@@ -13723,14 +13714,12 @@
             </a:pPr>
             <a:r>
               <a:rPr lang="en-US" sz="2000" b="1">
-                <a:latin typeface="Times New Roman" panose="02020603050405020304" pitchFamily="18" charset="0"/>
                 <a:cs typeface="Times New Roman" panose="02020603050405020304" pitchFamily="18" charset="0"/>
               </a:rPr>
               <a:t>Search </a:t>
             </a:r>
             <a:r>
               <a:rPr lang="en-US" sz="2000" b="1" dirty="0">
-                <a:latin typeface="Times New Roman" panose="02020603050405020304" pitchFamily="18" charset="0"/>
                 <a:cs typeface="Times New Roman" panose="02020603050405020304" pitchFamily="18" charset="0"/>
               </a:rPr>
               <a:t>Engine Optimization</a:t>
@@ -13742,7 +13731,6 @@
               <a:buChar char="•"/>
             </a:pPr>
             <a:endParaRPr lang="en-US" sz="2000" b="1">
-              <a:latin typeface="Times New Roman" panose="02020603050405020304" pitchFamily="18" charset="0"/>
               <a:cs typeface="Times New Roman" panose="02020603050405020304" pitchFamily="18" charset="0"/>
             </a:endParaRPr>
           </a:p>
@@ -13753,14 +13741,12 @@
             </a:pPr>
             <a:r>
               <a:rPr lang="en-US" sz="2000" b="1">
-                <a:latin typeface="Times New Roman" panose="02020603050405020304" pitchFamily="18" charset="0"/>
                 <a:cs typeface="Times New Roman" panose="02020603050405020304" pitchFamily="18" charset="0"/>
               </a:rPr>
               <a:t>Responsive </a:t>
             </a:r>
             <a:r>
               <a:rPr lang="en-US" sz="2000" b="1" dirty="0">
-                <a:latin typeface="Times New Roman" panose="02020603050405020304" pitchFamily="18" charset="0"/>
                 <a:cs typeface="Times New Roman" panose="02020603050405020304" pitchFamily="18" charset="0"/>
               </a:rPr>
               <a:t>Web Design</a:t>
@@ -17942,6 +17928,244 @@
     <p:extLst>
       <p:ext uri="{BB962C8B-B14F-4D97-AF65-F5344CB8AC3E}">
         <p14:creationId xmlns:p14="http://schemas.microsoft.com/office/powerpoint/2010/main" val="3736116953"/>
+      </p:ext>
+    </p:extLst>
+  </p:cSld>
+  <p:clrMapOvr>
+    <a:masterClrMapping/>
+  </p:clrMapOvr>
+</p:sld>
+</file>
+
+<file path=ppt/slides/slide45.xml><?xml version="1.0" encoding="utf-8"?>
+<p:sld xmlns:a="http://schemas.openxmlformats.org/drawingml/2006/main" xmlns:r="http://schemas.openxmlformats.org/officeDocument/2006/relationships" xmlns:p="http://schemas.openxmlformats.org/presentationml/2006/main">
+  <p:cSld>
+    <p:spTree>
+      <p:nvGrpSpPr>
+        <p:cNvPr id="1" name=""/>
+        <p:cNvGrpSpPr/>
+        <p:nvPr/>
+      </p:nvGrpSpPr>
+      <p:grpSpPr>
+        <a:xfrm>
+          <a:off x="0" y="0"/>
+          <a:ext cx="0" cy="0"/>
+          <a:chOff x="0" y="0"/>
+          <a:chExt cx="0" cy="0"/>
+        </a:xfrm>
+      </p:grpSpPr>
+      <p:sp>
+        <p:nvSpPr>
+          <p:cNvPr id="2" name="Title 1">
+            <a:extLst>
+              <a:ext uri="{FF2B5EF4-FFF2-40B4-BE49-F238E27FC236}">
+                <a16:creationId xmlns:a16="http://schemas.microsoft.com/office/drawing/2014/main" id="{ED7252AE-FA2E-4E58-B391-A15BE3EEC3E1}"/>
+              </a:ext>
+            </a:extLst>
+          </p:cNvPr>
+          <p:cNvSpPr>
+            <a:spLocks noGrp="1"/>
+          </p:cNvSpPr>
+          <p:nvPr>
+            <p:ph type="title"/>
+          </p:nvPr>
+        </p:nvSpPr>
+        <p:spPr/>
+        <p:txBody>
+          <a:bodyPr/>
+          <a:lstStyle/>
+          <a:p>
+            <a:pPr marL="0" marR="0">
+              <a:spcBef>
+                <a:spcPts val="0"/>
+              </a:spcBef>
+              <a:spcAft>
+                <a:spcPts val="600"/>
+              </a:spcAft>
+              <a:tabLst>
+                <a:tab pos="1371600" algn="l"/>
+              </a:tabLst>
+            </a:pPr>
+            <a:r>
+              <a:rPr lang="en-US">
+                <a:latin typeface="Arial" panose="020B0604020202020204" pitchFamily="34" charset="0"/>
+                <a:ea typeface="Times New Roman" panose="02020603050405020304" pitchFamily="18" charset="0"/>
+                <a:cs typeface="Times New Roman" panose="02020603050405020304" pitchFamily="18" charset="0"/>
+              </a:rPr>
+              <a:t>Assignments</a:t>
+            </a:r>
+            <a:endParaRPr lang="en-US" dirty="0"/>
+          </a:p>
+        </p:txBody>
+      </p:sp>
+      <p:sp>
+        <p:nvSpPr>
+          <p:cNvPr id="3" name="Text Placeholder 2">
+            <a:extLst>
+              <a:ext uri="{FF2B5EF4-FFF2-40B4-BE49-F238E27FC236}">
+                <a16:creationId xmlns:a16="http://schemas.microsoft.com/office/drawing/2014/main" id="{A5EF7789-4C3D-477D-B4CF-99DF20746072}"/>
+              </a:ext>
+            </a:extLst>
+          </p:cNvPr>
+          <p:cNvSpPr>
+            <a:spLocks noGrp="1"/>
+          </p:cNvSpPr>
+          <p:nvPr>
+            <p:ph type="body" sz="quarter" idx="13"/>
+          </p:nvPr>
+        </p:nvSpPr>
+        <p:spPr/>
+        <p:txBody>
+          <a:bodyPr anchor="ctr"/>
+          <a:lstStyle/>
+          <a:p>
+            <a:pPr algn="ctr"/>
+            <a:r>
+              <a:rPr lang="en-US" sz="3200"/>
+              <a:t>Reading assignments on Perusall</a:t>
+            </a:r>
+          </a:p>
+          <a:p>
+            <a:pPr algn="ctr"/>
+            <a:endParaRPr lang="en-US" sz="3200"/>
+          </a:p>
+          <a:p>
+            <a:pPr algn="ctr"/>
+            <a:r>
+              <a:rPr lang="en-US" sz="3200"/>
+              <a:t>Homework and Labs on InsideRanken</a:t>
+            </a:r>
+            <a:endParaRPr lang="en-US" sz="3200" dirty="0"/>
+          </a:p>
+        </p:txBody>
+      </p:sp>
+      <p:sp>
+        <p:nvSpPr>
+          <p:cNvPr id="4" name="Date Placeholder 3">
+            <a:extLst>
+              <a:ext uri="{FF2B5EF4-FFF2-40B4-BE49-F238E27FC236}">
+                <a16:creationId xmlns:a16="http://schemas.microsoft.com/office/drawing/2014/main" id="{81473463-BB85-42FA-8837-C86737525827}"/>
+              </a:ext>
+            </a:extLst>
+          </p:cNvPr>
+          <p:cNvSpPr>
+            <a:spLocks noGrp="1"/>
+          </p:cNvSpPr>
+          <p:nvPr>
+            <p:ph type="dt" sz="half" idx="14"/>
+          </p:nvPr>
+        </p:nvSpPr>
+        <p:spPr/>
+        <p:txBody>
+          <a:bodyPr/>
+          <a:lstStyle/>
+          <a:p>
+            <a:pPr>
+              <a:defRPr/>
+            </a:pPr>
+            <a:r>
+              <a:rPr lang="en-US"/>
+              <a:t>Murach's HTML and CSS, 4th Edition</a:t>
+            </a:r>
+            <a:endParaRPr lang="en-US" dirty="0"/>
+          </a:p>
+        </p:txBody>
+      </p:sp>
+      <p:sp>
+        <p:nvSpPr>
+          <p:cNvPr id="5" name="Footer Placeholder 4">
+            <a:extLst>
+              <a:ext uri="{FF2B5EF4-FFF2-40B4-BE49-F238E27FC236}">
+                <a16:creationId xmlns:a16="http://schemas.microsoft.com/office/drawing/2014/main" id="{18C45EC9-CFAA-4E64-AB28-567C018826E3}"/>
+              </a:ext>
+            </a:extLst>
+          </p:cNvPr>
+          <p:cNvSpPr>
+            <a:spLocks noGrp="1"/>
+          </p:cNvSpPr>
+          <p:nvPr>
+            <p:ph type="ftr" sz="quarter" idx="15"/>
+          </p:nvPr>
+        </p:nvSpPr>
+        <p:spPr/>
+        <p:txBody>
+          <a:bodyPr/>
+          <a:lstStyle/>
+          <a:p>
+            <a:pPr>
+              <a:defRPr/>
+            </a:pPr>
+            <a:r>
+              <a:rPr lang="en-US"/>
+              <a:t>© 2018, Mike Murach &amp; Associates, Inc.</a:t>
+            </a:r>
+            <a:endParaRPr lang="en-US" dirty="0"/>
+          </a:p>
+        </p:txBody>
+      </p:sp>
+      <p:sp>
+        <p:nvSpPr>
+          <p:cNvPr id="6" name="Slide Number Placeholder 5">
+            <a:extLst>
+              <a:ext uri="{FF2B5EF4-FFF2-40B4-BE49-F238E27FC236}">
+                <a16:creationId xmlns:a16="http://schemas.microsoft.com/office/drawing/2014/main" id="{D54283AA-0BB0-4D43-B198-DEEA3857E135}"/>
+              </a:ext>
+            </a:extLst>
+          </p:cNvPr>
+          <p:cNvSpPr>
+            <a:spLocks noGrp="1"/>
+          </p:cNvSpPr>
+          <p:nvPr>
+            <p:ph type="sldNum" sz="quarter" idx="16"/>
+          </p:nvPr>
+        </p:nvSpPr>
+        <p:spPr/>
+        <p:txBody>
+          <a:bodyPr/>
+          <a:lstStyle/>
+          <a:p>
+            <a:pPr algn="l">
+              <a:defRPr/>
+            </a:pPr>
+            <a:endParaRPr lang="en-US" sz="1400" dirty="0">
+              <a:latin typeface="Times New Roman"/>
+            </a:endParaRPr>
+          </a:p>
+          <a:p>
+            <a:pPr>
+              <a:defRPr/>
+            </a:pPr>
+            <a:r>
+              <a:rPr lang="en-US" dirty="0">
+                <a:solidFill>
+                  <a:schemeClr val="bg1"/>
+                </a:solidFill>
+              </a:rPr>
+              <a:t>C1, Slide </a:t>
+            </a:r>
+            <a:fld id="{BF5C1183-B085-4070-A402-C03A3F977D3D}" type="slidenum">
+              <a:rPr lang="en-US" smtClean="0">
+                <a:solidFill>
+                  <a:schemeClr val="bg1"/>
+                </a:solidFill>
+              </a:rPr>
+              <a:pPr>
+                <a:defRPr/>
+              </a:pPr>
+              <a:t>45</a:t>
+            </a:fld>
+            <a:endParaRPr lang="en-US" dirty="0">
+              <a:solidFill>
+                <a:schemeClr val="bg1"/>
+              </a:solidFill>
+            </a:endParaRPr>
+          </a:p>
+        </p:txBody>
+      </p:sp>
+    </p:spTree>
+    <p:extLst>
+      <p:ext uri="{BB962C8B-B14F-4D97-AF65-F5344CB8AC3E}">
+        <p14:creationId xmlns:p14="http://schemas.microsoft.com/office/powerpoint/2010/main" val="1776199089"/>
       </p:ext>
     </p:extLst>
   </p:cSld>

</xml_diff>

<commit_message>
Updating chapter titles to make it clearer what is in each chapter
</commit_message>
<xml_diff>
--- a/murach_html_4e/slides/Chapter 1 slides (Revised).pptx
+++ b/murach_html_4e/slides/Chapter 1 slides (Revised).pptx
@@ -374,7 +374,7 @@
               <a:pPr>
                 <a:defRPr/>
               </a:pPr>
-              <a:t>5/28/2020</a:t>
+              <a:t>6/16/2020</a:t>
             </a:fld>
             <a:endParaRPr lang="en-US"/>
           </a:p>
@@ -3590,7 +3590,12 @@
             <p:ph type="body" sz="quarter" idx="13"/>
           </p:nvPr>
         </p:nvSpPr>
-        <p:spPr/>
+        <p:spPr>
+          <a:xfrm>
+            <a:off x="0" y="2209800"/>
+            <a:ext cx="9144000" cy="2971800"/>
+          </a:xfrm>
+        </p:spPr>
         <p:txBody>
           <a:bodyPr/>
           <a:lstStyle/>
@@ -3607,7 +3612,7 @@
               </a:tabLst>
             </a:pPr>
             <a:r>
-              <a:rPr lang="en-US" dirty="0">
+              <a:rPr lang="en-US">
                 <a:solidFill>
                   <a:srgbClr val="000000"/>
                 </a:solidFill>
@@ -3615,8 +3620,40 @@
                 <a:ea typeface="Times New Roman" panose="02020603050405020304" pitchFamily="18" charset="0"/>
                 <a:cs typeface="Times New Roman" panose="02020603050405020304" pitchFamily="18" charset="0"/>
               </a:rPr>
-              <a:t>Introduction to web development</a:t>
-            </a:r>
+              <a:t>Introduction to</a:t>
+            </a:r>
+          </a:p>
+          <a:p>
+            <a:pPr>
+              <a:spcBef>
+                <a:spcPts val="2400"/>
+              </a:spcBef>
+              <a:spcAft>
+                <a:spcPts val="600"/>
+              </a:spcAft>
+              <a:tabLst>
+                <a:tab pos="1371600" algn="l"/>
+              </a:tabLst>
+            </a:pPr>
+            <a:r>
+              <a:rPr lang="en-US">
+                <a:solidFill>
+                  <a:srgbClr val="000000"/>
+                </a:solidFill>
+                <a:latin typeface="Arial" panose="020B0604020202020204" pitchFamily="34" charset="0"/>
+                <a:ea typeface="Times New Roman" panose="02020603050405020304" pitchFamily="18" charset="0"/>
+                <a:cs typeface="Times New Roman" panose="02020603050405020304" pitchFamily="18" charset="0"/>
+              </a:rPr>
+              <a:t>Web Development</a:t>
+            </a:r>
+            <a:endParaRPr lang="en-US" dirty="0">
+              <a:solidFill>
+                <a:srgbClr val="000000"/>
+              </a:solidFill>
+              <a:latin typeface="Arial" panose="020B0604020202020204" pitchFamily="34" charset="0"/>
+              <a:ea typeface="Times New Roman" panose="02020603050405020304" pitchFamily="18" charset="0"/>
+              <a:cs typeface="Times New Roman" panose="02020603050405020304" pitchFamily="18" charset="0"/>
+            </a:endParaRPr>
           </a:p>
           <a:p>
             <a:endParaRPr lang="en-US" dirty="0"/>

</xml_diff>